<commit_message>
Using bullet points instead of string
</commit_message>
<xml_diff>
--- a/data/output/Christmas_Presentation.pptx
+++ b/data/output/Christmas_Presentation.pptx
@@ -7,7 +7,6 @@
   <p:sldIdLst>
     <p:sldId id="256" r:id="rId7"/>
     <p:sldId id="257" r:id="rId8"/>
-    <p:sldId id="258" r:id="rId9"/>
   </p:sldIdLst>
   <p:sldSz cx="9144000" cy="6858000" type="screen4x3"/>
   <p:notesSz cx="6858000" cy="9144000"/>
@@ -3165,116 +3164,6 @@
 </file>
 
 <file path=ppt/slides/slide2.xml><?xml version="1.0" encoding="utf-8"?>
-<p:sld xmlns:a="http://schemas.openxmlformats.org/drawingml/2006/main" xmlns:p="http://schemas.openxmlformats.org/presentationml/2006/main" xmlns:r="http://schemas.openxmlformats.org/officeDocument/2006/relationships">
-  <p:cSld>
-    <p:bg>
-      <p:bgPr>
-        <a:solidFill>
-          <a:srgbClr val="0C3823"/>
-        </a:solidFill>
-        <a:effectLst/>
-      </p:bgPr>
-    </p:bg>
-    <p:spTree>
-      <p:nvGrpSpPr>
-        <p:cNvPr id="1" name=""/>
-        <p:cNvGrpSpPr/>
-        <p:nvPr/>
-      </p:nvGrpSpPr>
-      <p:grpSpPr/>
-      <p:sp>
-        <p:nvSpPr>
-          <p:cNvPr id="2" name="Title 1"/>
-          <p:cNvSpPr>
-            <a:spLocks noGrp="1"/>
-          </p:cNvSpPr>
-          <p:nvPr>
-            <p:ph type="title"/>
-          </p:nvPr>
-        </p:nvSpPr>
-        <p:spPr/>
-        <p:txBody>
-          <a:bodyPr/>
-          <a:lstStyle/>
-          <a:p>
-            <a:pPr algn="l">
-              <a:defRPr sz="4000">
-                <a:solidFill>
-                  <a:srgbClr val="FFFFFF"/>
-                </a:solidFill>
-                <a:latin typeface="Calibri"/>
-              </a:defRPr>
-            </a:pPr>
-            <a:r>
-              <a:t>Winter Facts</a:t>
-            </a:r>
-          </a:p>
-        </p:txBody>
-      </p:sp>
-      <p:sp>
-        <p:nvSpPr>
-          <p:cNvPr id="3" name="Content Placeholder 2"/>
-          <p:cNvSpPr>
-            <a:spLocks noGrp="1"/>
-          </p:cNvSpPr>
-          <p:nvPr>
-            <p:ph idx="1"/>
-          </p:nvPr>
-        </p:nvSpPr>
-        <p:spPr/>
-        <p:txBody>
-          <a:bodyPr/>
-          <a:lstStyle/>
-          <a:p>
-            <a:pPr algn="l">
-              <a:defRPr sz="2400">
-                <a:solidFill>
-                  <a:srgbClr val="FFFFFF"/>
-                </a:solidFill>
-                <a:latin typeface="Calibri"/>
-              </a:defRPr>
-            </a:pPr>
-            <a:r>
-              <a:t>1. Snow is white</a:t>
-            </a:r>
-          </a:p>
-          <a:p>
-            <a:pPr algn="l">
-              <a:defRPr sz="2400">
-                <a:solidFill>
-                  <a:srgbClr val="FFFFFF"/>
-                </a:solidFill>
-                <a:latin typeface="Calibri"/>
-              </a:defRPr>
-            </a:pPr>
-            <a:r>
-              <a:t>2. It's cold</a:t>
-            </a:r>
-          </a:p>
-          <a:p>
-            <a:pPr algn="l">
-              <a:defRPr sz="2400">
-                <a:solidFill>
-                  <a:srgbClr val="FFFFFF"/>
-                </a:solidFill>
-                <a:latin typeface="Calibri"/>
-              </a:defRPr>
-            </a:pPr>
-            <a:r>
-              <a:t>3. People build snowmen</a:t>
-            </a:r>
-          </a:p>
-        </p:txBody>
-      </p:sp>
-    </p:spTree>
-  </p:cSld>
-  <p:clrMapOvr>
-    <a:masterClrMapping/>
-  </p:clrMapOvr>
-</p:sld>
-</file>
-
-<file path=ppt/slides/slide3.xml><?xml version="1.0" encoding="utf-8"?>
 <p:sld xmlns:a="http://schemas.openxmlformats.org/drawingml/2006/main" xmlns:p="http://schemas.openxmlformats.org/presentationml/2006/main" xmlns:r="http://schemas.openxmlformats.org/officeDocument/2006/relationships">
   <p:cSld>
     <p:bg>

</xml_diff>

<commit_message>
Contruct presentation from dataframe
</commit_message>
<xml_diff>
--- a/data/output/Christmas_Presentation.pptx
+++ b/data/output/Christmas_Presentation.pptx
@@ -7,6 +7,7 @@
   <p:sldIdLst>
     <p:sldId id="256" r:id="rId7"/>
     <p:sldId id="257" r:id="rId8"/>
+    <p:sldId id="258" r:id="rId9"/>
   </p:sldIdLst>
   <p:sldSz cx="9144000" cy="6858000" type="screen4x3"/>
   <p:notesSz cx="6858000" cy="9144000"/>
@@ -3084,9 +3085,17 @@
   <p:cSld>
     <p:bg>
       <p:bgPr>
-        <a:solidFill>
-          <a:srgbClr val="0C3823"/>
-        </a:solidFill>
+        <a:gradFill rotWithShape="1">
+          <a:gsLst>
+            <a:gs pos="0">
+              <a:srgbClr val="0C3823"/>
+            </a:gs>
+            <a:gs pos="100000">
+              <a:srgbClr val="09291A"/>
+            </a:gs>
+          </a:gsLst>
+          <a:lin scaled="0" ang="18900000"/>
+        </a:gradFill>
         <a:effectLst/>
       </p:bgPr>
     </p:bg>
@@ -3114,9 +3123,17 @@
           <a:p>
             <a:pPr algn="ctr">
               <a:defRPr sz="5400">
-                <a:solidFill>
-                  <a:srgbClr val="FFFFFF"/>
-                </a:solidFill>
+                <a:gradFill rotWithShape="1">
+                  <a:gsLst>
+                    <a:gs pos="0">
+                      <a:srgbClr val="FFFFFF"/>
+                    </a:gs>
+                    <a:gs pos="100000">
+                      <a:srgbClr val="F0F0F0"/>
+                    </a:gs>
+                  </a:gsLst>
+                  <a:lin scaled="0"/>
+                </a:gradFill>
                 <a:latin typeface="Calibri"/>
               </a:defRPr>
             </a:pPr>
@@ -3143,9 +3160,17 @@
           <a:p>
             <a:pPr algn="ctr">
               <a:defRPr sz="3200">
-                <a:solidFill>
-                  <a:srgbClr val="FFD700"/>
-                </a:solidFill>
+                <a:gradFill rotWithShape="1">
+                  <a:gsLst>
+                    <a:gs pos="0">
+                      <a:srgbClr val="FFD700"/>
+                    </a:gs>
+                    <a:gs pos="100000">
+                      <a:srgbClr val="CCAC00"/>
+                    </a:gs>
+                  </a:gsLst>
+                  <a:lin scaled="0"/>
+                </a:gradFill>
                 <a:latin typeface="Calibri Light"/>
               </a:defRPr>
             </a:pPr>
@@ -3168,9 +3193,17 @@
   <p:cSld>
     <p:bg>
       <p:bgPr>
-        <a:solidFill>
-          <a:srgbClr val="0C3823"/>
-        </a:solidFill>
+        <a:gradFill rotWithShape="1">
+          <a:gsLst>
+            <a:gs pos="0">
+              <a:srgbClr val="0C3823"/>
+            </a:gs>
+            <a:gs pos="100000">
+              <a:srgbClr val="09291A"/>
+            </a:gs>
+          </a:gsLst>
+          <a:lin scaled="0" ang="18900000"/>
+        </a:gradFill>
         <a:effectLst/>
       </p:bgPr>
     </p:bg>
@@ -3196,11 +3229,170 @@
           <a:bodyPr/>
           <a:lstStyle/>
           <a:p>
+            <a:pPr algn="l">
+              <a:defRPr sz="4000">
+                <a:gradFill rotWithShape="1">
+                  <a:gsLst>
+                    <a:gs pos="0">
+                      <a:srgbClr val="FFFFFF"/>
+                    </a:gs>
+                    <a:gs pos="100000">
+                      <a:srgbClr val="F0F0F0"/>
+                    </a:gs>
+                  </a:gsLst>
+                  <a:lin scaled="0"/>
+                </a:gradFill>
+                <a:latin typeface="Calibri"/>
+              </a:defRPr>
+            </a:pPr>
+            <a:r>
+              <a:t>Winter Facts</a:t>
+            </a:r>
+          </a:p>
+        </p:txBody>
+      </p:sp>
+      <p:sp>
+        <p:nvSpPr>
+          <p:cNvPr id="3" name="Content Placeholder 2"/>
+          <p:cNvSpPr>
+            <a:spLocks noGrp="1"/>
+          </p:cNvSpPr>
+          <p:nvPr>
+            <p:ph idx="1"/>
+          </p:nvPr>
+        </p:nvSpPr>
+        <p:spPr/>
+        <p:txBody>
+          <a:bodyPr/>
+          <a:lstStyle/>
+          <a:p/>
+          <a:p>
+            <a:pPr algn="l">
+              <a:defRPr sz="3200">
+                <a:gradFill rotWithShape="1">
+                  <a:gsLst>
+                    <a:gs pos="0">
+                      <a:srgbClr val="FFFFFF"/>
+                    </a:gs>
+                    <a:gs pos="100000">
+                      <a:srgbClr val="F0F0F0"/>
+                    </a:gs>
+                  </a:gsLst>
+                  <a:lin scaled="0"/>
+                </a:gradFill>
+                <a:latin typeface="Arial"/>
+              </a:defRPr>
+            </a:pPr>
+            <a:r>
+              <a:t>Snow is white</a:t>
+            </a:r>
+          </a:p>
+          <a:p>
+            <a:pPr algn="l">
+              <a:defRPr sz="3200">
+                <a:gradFill rotWithShape="1">
+                  <a:gsLst>
+                    <a:gs pos="0">
+                      <a:srgbClr val="FFFFFF"/>
+                    </a:gs>
+                    <a:gs pos="100000">
+                      <a:srgbClr val="F0F0F0"/>
+                    </a:gs>
+                  </a:gsLst>
+                  <a:lin scaled="0"/>
+                </a:gradFill>
+                <a:latin typeface="Arial"/>
+              </a:defRPr>
+            </a:pPr>
+            <a:r>
+              <a:t>It's cold</a:t>
+            </a:r>
+          </a:p>
+          <a:p>
+            <a:pPr algn="l">
+              <a:defRPr sz="3200">
+                <a:gradFill rotWithShape="1">
+                  <a:gsLst>
+                    <a:gs pos="0">
+                      <a:srgbClr val="FFFFFF"/>
+                    </a:gs>
+                    <a:gs pos="100000">
+                      <a:srgbClr val="F0F0F0"/>
+                    </a:gs>
+                  </a:gsLst>
+                  <a:lin scaled="0"/>
+                </a:gradFill>
+                <a:latin typeface="Arial"/>
+              </a:defRPr>
+            </a:pPr>
+            <a:r>
+              <a:t>People build snowmen</a:t>
+            </a:r>
+          </a:p>
+        </p:txBody>
+      </p:sp>
+    </p:spTree>
+  </p:cSld>
+  <p:clrMapOvr>
+    <a:masterClrMapping/>
+  </p:clrMapOvr>
+</p:sld>
+</file>
+
+<file path=ppt/slides/slide3.xml><?xml version="1.0" encoding="utf-8"?>
+<p:sld xmlns:a="http://schemas.openxmlformats.org/drawingml/2006/main" xmlns:p="http://schemas.openxmlformats.org/presentationml/2006/main" xmlns:r="http://schemas.openxmlformats.org/officeDocument/2006/relationships">
+  <p:cSld>
+    <p:bg>
+      <p:bgPr>
+        <a:gradFill rotWithShape="1">
+          <a:gsLst>
+            <a:gs pos="0">
+              <a:srgbClr val="0C3823"/>
+            </a:gs>
+            <a:gs pos="100000">
+              <a:srgbClr val="09291A"/>
+            </a:gs>
+          </a:gsLst>
+          <a:lin scaled="0" ang="18900000"/>
+        </a:gradFill>
+        <a:effectLst/>
+      </p:bgPr>
+    </p:bg>
+    <p:spTree>
+      <p:nvGrpSpPr>
+        <p:cNvPr id="1" name=""/>
+        <p:cNvGrpSpPr/>
+        <p:nvPr/>
+      </p:nvGrpSpPr>
+      <p:grpSpPr/>
+      <p:sp>
+        <p:nvSpPr>
+          <p:cNvPr id="2" name="Title 1"/>
+          <p:cNvSpPr>
+            <a:spLocks noGrp="1"/>
+          </p:cNvSpPr>
+          <p:nvPr>
+            <p:ph type="title"/>
+          </p:nvPr>
+        </p:nvSpPr>
+        <p:spPr/>
+        <p:txBody>
+          <a:bodyPr/>
+          <a:lstStyle/>
+          <a:p>
             <a:pPr algn="ctr">
               <a:defRPr sz="4000" b="1">
-                <a:solidFill>
-                  <a:srgbClr val="FFFFFF"/>
-                </a:solidFill>
+                <a:gradFill rotWithShape="1">
+                  <a:gsLst>
+                    <a:gs pos="0">
+                      <a:srgbClr val="FFFFFF"/>
+                    </a:gs>
+                    <a:gs pos="100000">
+                      <a:srgbClr val="F0F0F0"/>
+                    </a:gs>
+                  </a:gsLst>
+                  <a:lin scaled="0"/>
+                </a:gradFill>
                 <a:latin typeface="Calibri"/>
               </a:defRPr>
             </a:pPr>

</xml_diff>